<commit_message>
Fix typos and add notes to PPT deck
</commit_message>
<xml_diff>
--- a/RhoConnect-Push.pptx
+++ b/RhoConnect-Push.pptx
@@ -19,8 +19,8 @@
     <p:sldId id="261" r:id="rId10"/>
     <p:sldId id="280" r:id="rId11"/>
     <p:sldId id="281" r:id="rId12"/>
-    <p:sldId id="284" r:id="rId13"/>
-    <p:sldId id="283" r:id="rId14"/>
+    <p:sldId id="283" r:id="rId13"/>
+    <p:sldId id="286" r:id="rId14"/>
     <p:sldId id="272" r:id="rId15"/>
   </p:sldIdLst>
   <p:sldSz cx="9144000" cy="5143500" type="screen16x9"/>
@@ -206,7 +206,7 @@
             <a:fld id="{03226B35-E884-5E4D-87DA-A7EDD87DC00C}" type="datetimeFigureOut">
               <a:rPr lang="en-US" smtClean="0"/>
               <a:pPr/>
-              <a:t>9/2/14</a:t>
+              <a:t>09/4/14</a:t>
             </a:fld>
             <a:endParaRPr lang="en-US"/>
           </a:p>
@@ -373,7 +373,7 @@
             <a:fld id="{6D788B50-DD5C-5F41-9B32-973BBF99E849}" type="datetimeFigureOut">
               <a:rPr lang="en-US" smtClean="0"/>
               <a:pPr/>
-              <a:t>9/2/14</a:t>
+              <a:t>09/4/14</a:t>
             </a:fld>
             <a:endParaRPr lang="en-US"/>
           </a:p>
@@ -724,6 +724,189 @@
 </p:notes>
 </file>
 
+<file path=ppt/notesSlides/notesSlide10.xml><?xml version="1.0" encoding="utf-8"?>
+<p:notes xmlns:a="http://schemas.openxmlformats.org/drawingml/2006/main" xmlns:r="http://schemas.openxmlformats.org/officeDocument/2006/relationships" xmlns:p="http://schemas.openxmlformats.org/presentationml/2006/main">
+  <p:cSld>
+    <p:spTree>
+      <p:nvGrpSpPr>
+        <p:cNvPr id="1" name=""/>
+        <p:cNvGrpSpPr/>
+        <p:nvPr/>
+      </p:nvGrpSpPr>
+      <p:grpSpPr>
+        <a:xfrm>
+          <a:off x="0" y="0"/>
+          <a:ext cx="0" cy="0"/>
+          <a:chOff x="0" y="0"/>
+          <a:chExt cx="0" cy="0"/>
+        </a:xfrm>
+      </p:grpSpPr>
+      <p:sp>
+        <p:nvSpPr>
+          <p:cNvPr id="2" name="Slide Image Placeholder 1"/>
+          <p:cNvSpPr>
+            <a:spLocks noGrp="1" noRot="1" noChangeAspect="1"/>
+          </p:cNvSpPr>
+          <p:nvPr>
+            <p:ph type="sldImg"/>
+          </p:nvPr>
+        </p:nvSpPr>
+        <p:spPr/>
+      </p:sp>
+      <p:sp>
+        <p:nvSpPr>
+          <p:cNvPr id="3" name="Notes Placeholder 2"/>
+          <p:cNvSpPr>
+            <a:spLocks noGrp="1"/>
+          </p:cNvSpPr>
+          <p:nvPr>
+            <p:ph type="body" idx="1"/>
+          </p:nvPr>
+        </p:nvSpPr>
+        <p:spPr/>
+        <p:txBody>
+          <a:bodyPr>
+            <a:normAutofit/>
+          </a:bodyPr>
+          <a:lstStyle/>
+          <a:p>
+            <a:r>
+              <a:rPr lang="en-US" dirty="0" smtClean="0"/>
+              <a:t>Alright, let’s see it in action!</a:t>
+            </a:r>
+            <a:endParaRPr lang="en-US" dirty="0"/>
+          </a:p>
+        </p:txBody>
+      </p:sp>
+      <p:sp>
+        <p:nvSpPr>
+          <p:cNvPr id="4" name="Slide Number Placeholder 3"/>
+          <p:cNvSpPr>
+            <a:spLocks noGrp="1"/>
+          </p:cNvSpPr>
+          <p:nvPr>
+            <p:ph type="sldNum" sz="quarter" idx="10"/>
+          </p:nvPr>
+        </p:nvSpPr>
+        <p:spPr/>
+        <p:txBody>
+          <a:bodyPr/>
+          <a:lstStyle/>
+          <a:p>
+            <a:fld id="{D77A3FF8-68AA-A041-ADA3-194758FF0D5D}" type="slidenum">
+              <a:rPr lang="en-US" smtClean="0"/>
+              <a:pPr/>
+              <a:t>10</a:t>
+            </a:fld>
+            <a:endParaRPr lang="en-US"/>
+          </a:p>
+        </p:txBody>
+      </p:sp>
+    </p:spTree>
+  </p:cSld>
+  <p:clrMapOvr>
+    <a:masterClrMapping/>
+  </p:clrMapOvr>
+</p:notes>
+</file>
+
+<file path=ppt/notesSlides/notesSlide11.xml><?xml version="1.0" encoding="utf-8"?>
+<p:notes xmlns:a="http://schemas.openxmlformats.org/drawingml/2006/main" xmlns:r="http://schemas.openxmlformats.org/officeDocument/2006/relationships" xmlns:p="http://schemas.openxmlformats.org/presentationml/2006/main">
+  <p:cSld>
+    <p:spTree>
+      <p:nvGrpSpPr>
+        <p:cNvPr id="1" name=""/>
+        <p:cNvGrpSpPr/>
+        <p:nvPr/>
+      </p:nvGrpSpPr>
+      <p:grpSpPr>
+        <a:xfrm>
+          <a:off x="0" y="0"/>
+          <a:ext cx="0" cy="0"/>
+          <a:chOff x="0" y="0"/>
+          <a:chExt cx="0" cy="0"/>
+        </a:xfrm>
+      </p:grpSpPr>
+      <p:sp>
+        <p:nvSpPr>
+          <p:cNvPr id="2" name="Slide Image Placeholder 1"/>
+          <p:cNvSpPr>
+            <a:spLocks noGrp="1" noRot="1" noChangeAspect="1"/>
+          </p:cNvSpPr>
+          <p:nvPr>
+            <p:ph type="sldImg"/>
+          </p:nvPr>
+        </p:nvSpPr>
+        <p:spPr/>
+      </p:sp>
+      <p:sp>
+        <p:nvSpPr>
+          <p:cNvPr id="3" name="Notes Placeholder 2"/>
+          <p:cNvSpPr>
+            <a:spLocks noGrp="1"/>
+          </p:cNvSpPr>
+          <p:nvPr>
+            <p:ph type="body" idx="1"/>
+          </p:nvPr>
+        </p:nvSpPr>
+        <p:spPr/>
+        <p:txBody>
+          <a:bodyPr/>
+          <a:lstStyle/>
+          <a:p>
+            <a:r>
+              <a:rPr lang="en-US" dirty="0" smtClean="0"/>
+              <a:t>Thank you very much for attending, enjoy the rest of </a:t>
+            </a:r>
+            <a:r>
+              <a:rPr lang="en-US" dirty="0" err="1" smtClean="0"/>
+              <a:t>AppForum</a:t>
+            </a:r>
+            <a:r>
+              <a:rPr lang="en-US" baseline="0" dirty="0" smtClean="0"/>
+              <a:t> 2014</a:t>
+            </a:r>
+            <a:endParaRPr lang="en-US" dirty="0"/>
+          </a:p>
+        </p:txBody>
+      </p:sp>
+      <p:sp>
+        <p:nvSpPr>
+          <p:cNvPr id="4" name="Slide Number Placeholder 3"/>
+          <p:cNvSpPr>
+            <a:spLocks noGrp="1"/>
+          </p:cNvSpPr>
+          <p:nvPr>
+            <p:ph type="sldNum" sz="quarter" idx="10"/>
+          </p:nvPr>
+        </p:nvSpPr>
+        <p:spPr/>
+        <p:txBody>
+          <a:bodyPr/>
+          <a:lstStyle/>
+          <a:p>
+            <a:fld id="{D77A3FF8-68AA-A041-ADA3-194758FF0D5D}" type="slidenum">
+              <a:rPr lang="en-US" smtClean="0"/>
+              <a:pPr/>
+              <a:t>11</a:t>
+            </a:fld>
+            <a:endParaRPr lang="en-US"/>
+          </a:p>
+        </p:txBody>
+      </p:sp>
+    </p:spTree>
+    <p:extLst>
+      <p:ext uri="{BB962C8B-B14F-4D97-AF65-F5344CB8AC3E}">
+        <p14:creationId xmlns:p14="http://schemas.microsoft.com/office/powerpoint/2010/main" val="1248143595"/>
+      </p:ext>
+    </p:extLst>
+  </p:cSld>
+  <p:clrMapOvr>
+    <a:masterClrMapping/>
+  </p:clrMapOvr>
+</p:notes>
+</file>
+
 <file path=ppt/notesSlides/notesSlide2.xml><?xml version="1.0" encoding="utf-8"?>
 <p:notes xmlns:a="http://schemas.openxmlformats.org/drawingml/2006/main" xmlns:r="http://schemas.openxmlformats.org/officeDocument/2006/relationships" xmlns:p="http://schemas.openxmlformats.org/presentationml/2006/main">
   <p:cSld>
@@ -770,7 +953,31 @@
           </a:bodyPr>
           <a:lstStyle/>
           <a:p>
-            <a:endParaRPr lang="en-US"/>
+            <a:r>
+              <a:rPr lang="en-US" dirty="0" smtClean="0"/>
+              <a:t>Welcome to the</a:t>
+            </a:r>
+            <a:r>
+              <a:rPr lang="en-US" baseline="0" dirty="0" smtClean="0"/>
+              <a:t> RhoConnect Push session. My name is Michael Toews </a:t>
+            </a:r>
+            <a:r>
+              <a:rPr lang="en-US" baseline="0" smtClean="0"/>
+              <a:t>and I’m </a:t>
+            </a:r>
+            <a:r>
+              <a:rPr lang="en-US" baseline="0" dirty="0" smtClean="0"/>
+              <a:t>joined by Matt English and Alex </a:t>
+            </a:r>
+            <a:r>
+              <a:rPr lang="en-US" baseline="0" dirty="0" err="1" smtClean="0"/>
+              <a:t>Babichev</a:t>
+            </a:r>
+            <a:r>
+              <a:rPr lang="en-US" baseline="0" dirty="0" smtClean="0"/>
+              <a:t> for technical expertise.</a:t>
+            </a:r>
+            <a:endParaRPr lang="en-US" dirty="0"/>
           </a:p>
         </p:txBody>
       </p:sp>
@@ -852,7 +1059,47 @@
           </a:bodyPr>
           <a:lstStyle/>
           <a:p>
-            <a:endParaRPr lang="en-US"/>
+            <a:r>
+              <a:rPr lang="en-US" baseline="0" dirty="0" smtClean="0"/>
+              <a:t>Implementing PUSH notifications in the enterprise environment can be very difficult if not impossible. Whether the problem be the intranet or firewall restricting access to outside resources or your chosen platform not having the capability at all, PUSH can be a heck of a problem to have to deal with.</a:t>
+            </a:r>
+          </a:p>
+          <a:p>
+            <a:endParaRPr lang="en-US" baseline="0" dirty="0" smtClean="0"/>
+          </a:p>
+          <a:p>
+            <a:r>
+              <a:rPr lang="en-US" baseline="0" dirty="0" smtClean="0"/>
+              <a:t>Luckily, there is RhoConnect Push.</a:t>
+            </a:r>
+          </a:p>
+          <a:p>
+            <a:endParaRPr lang="en-US" baseline="0" dirty="0" smtClean="0"/>
+          </a:p>
+          <a:p>
+            <a:r>
+              <a:rPr lang="en-US" baseline="0" dirty="0" smtClean="0"/>
+              <a:t>With RhoConnect Push, you can send your traffic through your internal network to your RhoConnect app (deployed internally). When your devices poll the RC app, they will receive their notifications.</a:t>
+            </a:r>
+            <a:endParaRPr lang="en-US" baseline="0" dirty="0"/>
+          </a:p>
+          <a:p>
+            <a:endParaRPr lang="en-US" baseline="0" dirty="0"/>
+          </a:p>
+          <a:p>
+            <a:r>
+              <a:rPr lang="en-US" baseline="0" dirty="0" smtClean="0"/>
+              <a:t>You can even provide push notification capabilities to your apps running on platforms that do not traditionally have push support such as Windows Mobile and WinCE.</a:t>
+            </a:r>
+          </a:p>
+          <a:p>
+            <a:endParaRPr lang="en-US" baseline="0" dirty="0" smtClean="0"/>
+          </a:p>
+          <a:p>
+            <a:r>
+              <a:rPr lang="en-US" baseline="0" dirty="0" smtClean="0"/>
+              <a:t>Let’s look at a visual representation of this notification flow.</a:t>
+            </a:r>
           </a:p>
         </p:txBody>
       </p:sp>
@@ -934,19 +1181,29 @@
           <a:p>
             <a:r>
               <a:rPr lang="en-US" dirty="0" smtClean="0"/>
-              <a:t>Similar</a:t>
+              <a:t>As you can see here, the first</a:t>
             </a:r>
             <a:r>
               <a:rPr lang="en-US" baseline="0" dirty="0" smtClean="0"/>
-              <a:t> to slide 3 on </a:t>
-            </a:r>
-            <a:r>
-              <a:rPr lang="en-US" baseline="0" dirty="0" err="1" smtClean="0"/>
-              <a:t>RhoConenct-demo.ppt</a:t>
-            </a:r>
+              <a:t> thing that happens when setting up for push is, your device registers itself with the RhoConnect server, and the RC server adds the device to the list of devices that receive notifications from a specific RhoConnect app. This is done using the RhoConnect push service which resides on the device.</a:t>
+            </a:r>
+          </a:p>
+          <a:p>
+            <a:endParaRPr lang="en-US" baseline="0" dirty="0" smtClean="0"/>
+          </a:p>
+          <a:p>
             <a:r>
               <a:rPr lang="en-US" baseline="0" dirty="0" smtClean="0"/>
-              <a:t>; built using native intent;</a:t>
+              <a:t>At this point, your app is ready to receive notifications from the RhoConnect server.</a:t>
+            </a:r>
+          </a:p>
+          <a:p>
+            <a:endParaRPr lang="en-US" baseline="0" dirty="0" smtClean="0"/>
+          </a:p>
+          <a:p>
+            <a:r>
+              <a:rPr lang="en-US" baseline="0" dirty="0" smtClean="0"/>
+              <a:t>Let’s take a look at the flow of data.</a:t>
             </a:r>
             <a:endParaRPr lang="en-US" dirty="0"/>
           </a:p>
@@ -1030,12 +1287,49 @@
         </p:nvSpPr>
         <p:spPr/>
         <p:txBody>
-          <a:bodyPr>
-            <a:normAutofit/>
-          </a:bodyPr>
+          <a:bodyPr/>
           <a:lstStyle/>
           <a:p>
-            <a:endParaRPr lang="en-US"/>
+            <a:r>
+              <a:rPr lang="en-US" dirty="0" smtClean="0"/>
+              <a:t>After a notification</a:t>
+            </a:r>
+            <a:r>
+              <a:rPr lang="en-US" baseline="0" dirty="0" smtClean="0"/>
+              <a:t> is sent to the RhoConnect server, the notification s sent to a queue in the RhoConnect app to await polling from the device.</a:t>
+            </a:r>
+          </a:p>
+          <a:p>
+            <a:endParaRPr lang="en-US" dirty="0" smtClean="0"/>
+          </a:p>
+          <a:p>
+            <a:r>
+              <a:rPr lang="en-US" dirty="0" smtClean="0"/>
+              <a:t>Since notifications cannot literally be pushed down to the device, we use a poll system wherein</a:t>
+            </a:r>
+            <a:r>
+              <a:rPr lang="en-US" baseline="0" dirty="0" smtClean="0"/>
+              <a:t> your device will constantly ask the RhoConnect app if there are any notification for it. The frequency at which the device polls the back-end IS configurable so you can set it to a longer delay if you need to.</a:t>
+            </a:r>
+          </a:p>
+          <a:p>
+            <a:endParaRPr lang="en-US" baseline="0" dirty="0" smtClean="0"/>
+          </a:p>
+          <a:p>
+            <a:r>
+              <a:rPr lang="en-US" baseline="0" dirty="0" smtClean="0"/>
+              <a:t>If there are, the data for these notifications is downloaded to the device through the RhoConnect push service.</a:t>
+            </a:r>
+          </a:p>
+          <a:p>
+            <a:endParaRPr lang="en-US" baseline="0" dirty="0" smtClean="0"/>
+          </a:p>
+          <a:p>
+            <a:r>
+              <a:rPr lang="en-US" baseline="0" dirty="0" smtClean="0"/>
+              <a:t>Once the data is on the device, the RC push service sends the data to the app for processing. What is done with the data at this point is completely up to the app developer.</a:t>
+            </a:r>
+            <a:endParaRPr lang="en-US" dirty="0"/>
           </a:p>
         </p:txBody>
       </p:sp>
@@ -1057,13 +1351,18 @@
             <a:fld id="{D77A3FF8-68AA-A041-ADA3-194758FF0D5D}" type="slidenum">
               <a:rPr lang="en-US" smtClean="0"/>
               <a:pPr/>
-              <a:t>6</a:t>
+              <a:t>5</a:t>
             </a:fld>
             <a:endParaRPr lang="en-US"/>
           </a:p>
         </p:txBody>
       </p:sp>
     </p:spTree>
+    <p:extLst>
+      <p:ext uri="{BB962C8B-B14F-4D97-AF65-F5344CB8AC3E}">
+        <p14:creationId xmlns:p14="http://schemas.microsoft.com/office/powerpoint/2010/main" val="1830988703"/>
+      </p:ext>
+    </p:extLst>
   </p:cSld>
   <p:clrMapOvr>
     <a:masterClrMapping/>
@@ -1112,16 +1411,14 @@
         </p:nvSpPr>
         <p:spPr/>
         <p:txBody>
-          <a:bodyPr/>
+          <a:bodyPr>
+            <a:normAutofit/>
+          </a:bodyPr>
           <a:lstStyle/>
           <a:p>
             <a:r>
               <a:rPr lang="en-US" dirty="0" smtClean="0"/>
-              <a:t>Need to explain</a:t>
-            </a:r>
-            <a:r>
-              <a:rPr lang="en-US" baseline="0" dirty="0" smtClean="0"/>
-              <a:t> steps</a:t>
+              <a:t>Alright, enough talk about how the push service works, let’s get a demo started.</a:t>
             </a:r>
             <a:endParaRPr lang="en-US" dirty="0"/>
           </a:p>
@@ -1145,18 +1442,13 @@
             <a:fld id="{D77A3FF8-68AA-A041-ADA3-194758FF0D5D}" type="slidenum">
               <a:rPr lang="en-US" smtClean="0"/>
               <a:pPr/>
-              <a:t>7</a:t>
+              <a:t>6</a:t>
             </a:fld>
             <a:endParaRPr lang="en-US"/>
           </a:p>
         </p:txBody>
       </p:sp>
     </p:spTree>
-    <p:extLst>
-      <p:ext uri="{BB962C8B-B14F-4D97-AF65-F5344CB8AC3E}">
-        <p14:creationId xmlns:p14="http://schemas.microsoft.com/office/powerpoint/2010/main" val="3283166131"/>
-      </p:ext>
-    </p:extLst>
   </p:cSld>
   <p:clrMapOvr>
     <a:masterClrMapping/>
@@ -1205,12 +1497,106 @@
         </p:nvSpPr>
         <p:spPr/>
         <p:txBody>
-          <a:bodyPr>
-            <a:normAutofit/>
-          </a:bodyPr>
+          <a:bodyPr/>
           <a:lstStyle/>
           <a:p>
-            <a:endParaRPr lang="en-US"/>
+            <a:r>
+              <a:rPr lang="en-US" dirty="0" smtClean="0"/>
+              <a:t>I’m going to quickly explain how</a:t>
+            </a:r>
+            <a:r>
+              <a:rPr lang="en-US" baseline="0" dirty="0" smtClean="0"/>
+              <a:t> to implement push and then we’ll start a demo that we have already created.</a:t>
+            </a:r>
+          </a:p>
+          <a:p>
+            <a:endParaRPr lang="en-US" baseline="0" dirty="0" smtClean="0"/>
+          </a:p>
+          <a:p>
+            <a:r>
+              <a:rPr lang="en-US" baseline="0" dirty="0" smtClean="0"/>
+              <a:t>First you’ll need to setup your client-side app:</a:t>
+            </a:r>
+          </a:p>
+          <a:p>
+            <a:pPr marL="228600" indent="-228600">
+              <a:buAutoNum type="arabicParenR"/>
+            </a:pPr>
+            <a:r>
+              <a:rPr lang="en-US" baseline="0" dirty="0" smtClean="0"/>
+              <a:t>Create a rhodes app using the rhodes app command</a:t>
+            </a:r>
+          </a:p>
+          <a:p>
+            <a:pPr marL="228600" indent="-228600">
+              <a:buAutoNum type="arabicParenR"/>
+            </a:pPr>
+            <a:r>
+              <a:rPr lang="en-US" baseline="0" dirty="0" smtClean="0"/>
+              <a:t>Add a model to that app using the rhodes model command</a:t>
+            </a:r>
+          </a:p>
+          <a:p>
+            <a:pPr marL="228600" indent="-228600">
+              <a:buAutoNum type="arabicParenR"/>
+            </a:pPr>
+            <a:r>
+              <a:rPr lang="en-US" baseline="0" dirty="0" smtClean="0"/>
+              <a:t>Edit your rhoconfig.txt file to add the above mentioned lines</a:t>
+            </a:r>
+          </a:p>
+          <a:p>
+            <a:pPr marL="685800" lvl="1" indent="-228600">
+              <a:buAutoNum type="arabicParenR"/>
+            </a:pPr>
+            <a:r>
+              <a:rPr lang="en-US" baseline="0" dirty="0" err="1" smtClean="0"/>
+              <a:t>pushAppName</a:t>
+            </a:r>
+            <a:r>
+              <a:rPr lang="en-US" baseline="0" dirty="0" smtClean="0"/>
+              <a:t> should be your RhoConnect app’s name</a:t>
+            </a:r>
+          </a:p>
+          <a:p>
+            <a:pPr marL="685800" lvl="1" indent="-228600">
+              <a:buAutoNum type="arabicParenR"/>
+            </a:pPr>
+            <a:r>
+              <a:rPr lang="en-US" baseline="0" dirty="0" err="1" smtClean="0"/>
+              <a:t>pushServer</a:t>
+            </a:r>
+            <a:r>
+              <a:rPr lang="en-US" baseline="0" dirty="0" smtClean="0"/>
+              <a:t> will be the URL or IP address of the Push server.</a:t>
+            </a:r>
+          </a:p>
+          <a:p>
+            <a:pPr marL="685800" lvl="1" indent="-228600">
+              <a:buAutoNum type="arabicParenR"/>
+            </a:pPr>
+            <a:r>
+              <a:rPr lang="en-US" baseline="0" dirty="0" smtClean="0"/>
+              <a:t>Syncserver, as we have seen before, will be the URL or IP address of your RhoConnect server.</a:t>
+            </a:r>
+          </a:p>
+          <a:p>
+            <a:pPr marL="228600" lvl="0" indent="-228600">
+              <a:buAutoNum type="arabicParenR"/>
+            </a:pPr>
+            <a:r>
+              <a:rPr lang="en-US" baseline="0" dirty="0" smtClean="0"/>
+              <a:t>Add a link in your client app to the model in question.</a:t>
+            </a:r>
+          </a:p>
+          <a:p>
+            <a:pPr marL="228600" lvl="0" indent="-228600">
+              <a:buAutoNum type="arabicParenR"/>
+            </a:pPr>
+            <a:r>
+              <a:rPr lang="en-US" baseline="0" dirty="0" smtClean="0"/>
+              <a:t>Enable syncing of that model.</a:t>
+            </a:r>
           </a:p>
         </p:txBody>
       </p:sp>
@@ -1232,13 +1618,18 @@
             <a:fld id="{D77A3FF8-68AA-A041-ADA3-194758FF0D5D}" type="slidenum">
               <a:rPr lang="en-US" smtClean="0"/>
               <a:pPr/>
-              <a:t>10</a:t>
+              <a:t>7</a:t>
             </a:fld>
             <a:endParaRPr lang="en-US"/>
           </a:p>
         </p:txBody>
       </p:sp>
     </p:spTree>
+    <p:extLst>
+      <p:ext uri="{BB962C8B-B14F-4D97-AF65-F5344CB8AC3E}">
+        <p14:creationId xmlns:p14="http://schemas.microsoft.com/office/powerpoint/2010/main" val="3283166131"/>
+      </p:ext>
+    </p:extLst>
   </p:cSld>
   <p:clrMapOvr>
     <a:masterClrMapping/>
@@ -1290,7 +1681,112 @@
           <a:bodyPr/>
           <a:lstStyle/>
           <a:p>
-            <a:endParaRPr lang="en-US"/>
+            <a:r>
+              <a:rPr lang="en-US" dirty="0" smtClean="0"/>
+              <a:t>6)</a:t>
+            </a:r>
+            <a:r>
+              <a:rPr lang="en-US" baseline="0" dirty="0" smtClean="0"/>
+              <a:t> In your </a:t>
+            </a:r>
+            <a:r>
+              <a:rPr lang="en-US" baseline="0" dirty="0" err="1" smtClean="0"/>
+              <a:t>application.rb</a:t>
+            </a:r>
+            <a:r>
+              <a:rPr lang="en-US" baseline="0" dirty="0" smtClean="0"/>
+              <a:t> file, add the line mentioned here to set your push notification callback function </a:t>
+            </a:r>
+            <a:r>
+              <a:rPr lang="en-US" baseline="0" dirty="0" err="1" smtClean="0"/>
+              <a:t>push_callback</a:t>
+            </a:r>
+            <a:endParaRPr lang="en-US" baseline="0" dirty="0" smtClean="0"/>
+          </a:p>
+          <a:p>
+            <a:r>
+              <a:rPr lang="en-US" baseline="0" dirty="0" smtClean="0"/>
+              <a:t>7) In your Settings/</a:t>
+            </a:r>
+            <a:r>
+              <a:rPr lang="en-US" baseline="0" dirty="0" err="1" smtClean="0"/>
+              <a:t>controller.rb</a:t>
+            </a:r>
+            <a:endParaRPr lang="en-US" baseline="0" dirty="0" smtClean="0"/>
+          </a:p>
+          <a:p>
+            <a:r>
+              <a:rPr lang="en-US" baseline="0" dirty="0" smtClean="0"/>
+              <a:t>	1) Register for push in </a:t>
+            </a:r>
+            <a:r>
+              <a:rPr lang="en-US" baseline="0" dirty="0" err="1" smtClean="0"/>
+              <a:t>login_callback</a:t>
+            </a:r>
+            <a:endParaRPr lang="en-US" baseline="0" dirty="0" smtClean="0"/>
+          </a:p>
+          <a:p>
+            <a:r>
+              <a:rPr lang="en-US" baseline="0" dirty="0" smtClean="0"/>
+              <a:t>	2) Optionally, define a callback for push registration.</a:t>
+            </a:r>
+          </a:p>
+          <a:p>
+            <a:r>
+              <a:rPr lang="en-US" baseline="0" dirty="0" smtClean="0"/>
+              <a:t>	3) define the </a:t>
+            </a:r>
+            <a:r>
+              <a:rPr lang="en-US" baseline="0" dirty="0" err="1" smtClean="0"/>
+              <a:t>push_callback</a:t>
+            </a:r>
+            <a:r>
+              <a:rPr lang="en-US" baseline="0" dirty="0" smtClean="0"/>
+              <a:t>, which is the function we referred to in the first step of this slide.</a:t>
+            </a:r>
+          </a:p>
+          <a:p>
+            <a:r>
+              <a:rPr lang="en-US" baseline="0" dirty="0" smtClean="0"/>
+              <a:t>8) Add the rhoconnect-push extension to your app’s </a:t>
+            </a:r>
+            <a:r>
+              <a:rPr lang="en-US" baseline="0" dirty="0" err="1" smtClean="0"/>
+              <a:t>build.yml</a:t>
+            </a:r>
+            <a:r>
+              <a:rPr lang="en-US" baseline="0" dirty="0" smtClean="0"/>
+              <a:t>.</a:t>
+            </a:r>
+          </a:p>
+          <a:p>
+            <a:r>
+              <a:rPr lang="en-US" baseline="0" dirty="0" smtClean="0"/>
+              <a:t>9) Build your app</a:t>
+            </a:r>
+          </a:p>
+          <a:p>
+            <a:r>
+              <a:rPr lang="en-US" baseline="0" dirty="0" smtClean="0"/>
+              <a:t>10) Install both the built app package and the push-service package that comes with </a:t>
+            </a:r>
+            <a:r>
+              <a:rPr lang="en-US" baseline="0" dirty="0" err="1" smtClean="0"/>
+              <a:t>rhostudio</a:t>
+            </a:r>
+            <a:r>
+              <a:rPr lang="en-US" baseline="0" dirty="0" smtClean="0"/>
+              <a:t>.</a:t>
+            </a:r>
+          </a:p>
+          <a:p>
+            <a:endParaRPr lang="en-US" baseline="0" dirty="0" smtClean="0"/>
+          </a:p>
+          <a:p>
+            <a:r>
+              <a:rPr lang="en-US" baseline="0" dirty="0" smtClean="0"/>
+              <a:t>Once you are done with these steps, you are ready to start using push notifications.</a:t>
+            </a:r>
           </a:p>
         </p:txBody>
       </p:sp>
@@ -1312,7 +1808,7 @@
             <a:fld id="{D77A3FF8-68AA-A041-ADA3-194758FF0D5D}" type="slidenum">
               <a:rPr lang="en-US" smtClean="0"/>
               <a:pPr/>
-              <a:t>11</a:t>
+              <a:t>8</a:t>
             </a:fld>
             <a:endParaRPr lang="en-US"/>
           </a:p>
@@ -1321,9 +1817,95 @@
     </p:spTree>
     <p:extLst>
       <p:ext uri="{BB962C8B-B14F-4D97-AF65-F5344CB8AC3E}">
-        <p14:creationId xmlns:p14="http://schemas.microsoft.com/office/powerpoint/2010/main" val="1248143595"/>
+        <p14:creationId xmlns:p14="http://schemas.microsoft.com/office/powerpoint/2010/main" val="1567919623"/>
       </p:ext>
     </p:extLst>
+  </p:cSld>
+  <p:clrMapOvr>
+    <a:masterClrMapping/>
+  </p:clrMapOvr>
+</p:notes>
+</file>
+
+<file path=ppt/notesSlides/notesSlide9.xml><?xml version="1.0" encoding="utf-8"?>
+<p:notes xmlns:a="http://schemas.openxmlformats.org/drawingml/2006/main" xmlns:r="http://schemas.openxmlformats.org/officeDocument/2006/relationships" xmlns:p="http://schemas.openxmlformats.org/presentationml/2006/main">
+  <p:cSld>
+    <p:spTree>
+      <p:nvGrpSpPr>
+        <p:cNvPr id="1" name=""/>
+        <p:cNvGrpSpPr/>
+        <p:nvPr/>
+      </p:nvGrpSpPr>
+      <p:grpSpPr>
+        <a:xfrm>
+          <a:off x="0" y="0"/>
+          <a:ext cx="0" cy="0"/>
+          <a:chOff x="0" y="0"/>
+          <a:chExt cx="0" cy="0"/>
+        </a:xfrm>
+      </p:grpSpPr>
+      <p:sp>
+        <p:nvSpPr>
+          <p:cNvPr id="2" name="Slide Image Placeholder 1"/>
+          <p:cNvSpPr>
+            <a:spLocks noGrp="1" noRot="1" noChangeAspect="1"/>
+          </p:cNvSpPr>
+          <p:nvPr>
+            <p:ph type="sldImg"/>
+          </p:nvPr>
+        </p:nvSpPr>
+        <p:spPr/>
+      </p:sp>
+      <p:sp>
+        <p:nvSpPr>
+          <p:cNvPr id="3" name="Notes Placeholder 2"/>
+          <p:cNvSpPr>
+            <a:spLocks noGrp="1"/>
+          </p:cNvSpPr>
+          <p:nvPr>
+            <p:ph type="body" idx="1"/>
+          </p:nvPr>
+        </p:nvSpPr>
+        <p:spPr/>
+        <p:txBody>
+          <a:bodyPr>
+            <a:normAutofit/>
+          </a:bodyPr>
+          <a:lstStyle/>
+          <a:p>
+            <a:r>
+              <a:rPr lang="en-US" dirty="0" smtClean="0"/>
+              <a:t>Alright, let’s see it in action!</a:t>
+            </a:r>
+            <a:endParaRPr lang="en-US" dirty="0"/>
+          </a:p>
+        </p:txBody>
+      </p:sp>
+      <p:sp>
+        <p:nvSpPr>
+          <p:cNvPr id="4" name="Slide Number Placeholder 3"/>
+          <p:cNvSpPr>
+            <a:spLocks noGrp="1"/>
+          </p:cNvSpPr>
+          <p:nvPr>
+            <p:ph type="sldNum" sz="quarter" idx="10"/>
+          </p:nvPr>
+        </p:nvSpPr>
+        <p:spPr/>
+        <p:txBody>
+          <a:bodyPr/>
+          <a:lstStyle/>
+          <a:p>
+            <a:fld id="{D77A3FF8-68AA-A041-ADA3-194758FF0D5D}" type="slidenum">
+              <a:rPr lang="en-US" smtClean="0"/>
+              <a:pPr/>
+              <a:t>9</a:t>
+            </a:fld>
+            <a:endParaRPr lang="en-US"/>
+          </a:p>
+        </p:txBody>
+      </p:sp>
+    </p:spTree>
   </p:cSld>
   <p:clrMapOvr>
     <a:masterClrMapping/>
@@ -12055,7 +12637,7 @@
           <a:p>
             <a:r>
               <a:rPr lang="en-US" dirty="0" smtClean="0"/>
-              <a:t>Demo</a:t>
+              <a:t>Questions?</a:t>
             </a:r>
             <a:endParaRPr lang="en-US" dirty="0"/>
           </a:p>
@@ -12064,7 +12646,7 @@
     </p:spTree>
     <p:extLst>
       <p:ext uri="{BB962C8B-B14F-4D97-AF65-F5344CB8AC3E}">
-        <p14:creationId xmlns:p14="http://schemas.microsoft.com/office/powerpoint/2010/main" val="3318731730"/>
+        <p14:creationId xmlns:p14="http://schemas.microsoft.com/office/powerpoint/2010/main" val="1844208755"/>
       </p:ext>
     </p:extLst>
   </p:cSld>
@@ -12235,38 +12817,11 @@
               <a:rPr lang="en-US" dirty="0" smtClean="0">
                 <a:latin typeface="Arial"/>
               </a:rPr>
-              <a:t> Mike </a:t>
-            </a:r>
-            <a:r>
-              <a:rPr lang="en-US" dirty="0" err="1" smtClean="0">
-                <a:latin typeface="Arial"/>
-              </a:rPr>
-              <a:t>Towes</a:t>
-            </a:r>
-            <a:r>
-              <a:rPr lang="en-US" dirty="0" smtClean="0">
-                <a:latin typeface="Arial"/>
-              </a:rPr>
-              <a:t> </a:t>
-            </a:r>
-            <a:r>
-              <a:rPr lang="en-US" dirty="0" err="1" smtClean="0">
-                <a:latin typeface="Arial"/>
-              </a:rPr>
-              <a:t>Ι</a:t>
-            </a:r>
-            <a:r>
-              <a:rPr lang="en-US" dirty="0" smtClean="0">
-                <a:latin typeface="Arial"/>
-              </a:rPr>
-              <a:t>  </a:t>
-            </a:r>
-            <a:r>
-              <a:rPr lang="en-US" dirty="0">
-                <a:latin typeface="Arial"/>
-              </a:rPr>
-              <a:t>TITLE GOES HERE</a:t>
-            </a:r>
+              <a:t> &amp; Mike Toews</a:t>
+            </a:r>
+            <a:endParaRPr lang="en-US" dirty="0">
+              <a:latin typeface="Arial"/>
+            </a:endParaRPr>
           </a:p>
         </p:txBody>
       </p:sp>
@@ -13936,11 +14491,7 @@
           <a:p>
             <a:r>
               <a:rPr lang="en-US" dirty="0" smtClean="0"/>
-              <a:t>RhoConnect </a:t>
-            </a:r>
-            <a:r>
-              <a:rPr lang="en-US" dirty="0" smtClean="0"/>
-              <a:t>push </a:t>
+              <a:t>RhoConnect push </a:t>
             </a:r>
             <a:r>
               <a:rPr lang="en-US" smtClean="0"/>
@@ -14390,7 +14941,11 @@
             </a:r>
             <a:r>
               <a:rPr lang="en-US" dirty="0" smtClean="0"/>
-              <a:t> has necessary extensions</a:t>
+              <a:t> has necessary </a:t>
+            </a:r>
+            <a:r>
+              <a:rPr lang="en-US" dirty="0" smtClean="0"/>
+              <a:t>extensions</a:t>
             </a:r>
           </a:p>
           <a:p>
@@ -14403,6 +14958,18 @@
               <a:rPr lang="en-US" dirty="0" smtClean="0"/>
               <a:t>’</a:t>
             </a:r>
+            <a:endParaRPr lang="en-US" dirty="0" smtClean="0"/>
+          </a:p>
+          <a:p>
+            <a:pPr marL="285750" indent="-285750">
+              <a:buFont typeface="Arial"/>
+              <a:buChar char="•"/>
+            </a:pPr>
+            <a:r>
+              <a:rPr lang="en-US" dirty="0" smtClean="0"/>
+              <a:t>Build Your App</a:t>
+            </a:r>
+            <a:endParaRPr lang="en-US" dirty="0" smtClean="0"/>
           </a:p>
           <a:p>
             <a:pPr marL="285750" indent="-285750">
@@ -14564,56 +15131,49 @@
       </p:grpSpPr>
       <p:sp>
         <p:nvSpPr>
-          <p:cNvPr id="2" name="Title 1"/>
+          <p:cNvPr id="2" name="Text Placeholder 1"/>
           <p:cNvSpPr>
             <a:spLocks noGrp="1"/>
           </p:cNvSpPr>
           <p:nvPr>
-            <p:ph type="title"/>
+            <p:ph type="body" sz="quarter" idx="10"/>
           </p:nvPr>
         </p:nvSpPr>
-        <p:spPr/>
+        <p:spPr>
+          <a:xfrm>
+            <a:off x="276458" y="1889010"/>
+            <a:ext cx="8127828" cy="918200"/>
+          </a:xfrm>
+        </p:spPr>
         <p:txBody>
           <a:bodyPr/>
           <a:lstStyle/>
           <a:p>
             <a:r>
               <a:rPr lang="en-US" dirty="0" smtClean="0"/>
-              <a:t>RhoConnect-push server</a:t>
+              <a:t>Demo</a:t>
             </a:r>
             <a:endParaRPr lang="en-US" dirty="0"/>
-          </a:p>
-        </p:txBody>
-      </p:sp>
-      <p:sp>
-        <p:nvSpPr>
-          <p:cNvPr id="3" name="Content Placeholder 2"/>
-          <p:cNvSpPr>
-            <a:spLocks noGrp="1"/>
-          </p:cNvSpPr>
-          <p:nvPr>
-            <p:ph idx="1"/>
-          </p:nvPr>
-        </p:nvSpPr>
-        <p:spPr/>
-        <p:txBody>
-          <a:bodyPr/>
-          <a:lstStyle/>
-          <a:p>
-            <a:endParaRPr lang="en-US"/>
           </a:p>
         </p:txBody>
       </p:sp>
     </p:spTree>
     <p:extLst>
       <p:ext uri="{BB962C8B-B14F-4D97-AF65-F5344CB8AC3E}">
-        <p14:creationId xmlns:p14="http://schemas.microsoft.com/office/powerpoint/2010/main" val="2480844602"/>
+        <p14:creationId xmlns:p14="http://schemas.microsoft.com/office/powerpoint/2010/main" val="3318731730"/>
       </p:ext>
     </p:extLst>
   </p:cSld>
   <p:clrMapOvr>
     <a:masterClrMapping/>
   </p:clrMapOvr>
+  <p:timing>
+    <p:tnLst>
+      <p:par>
+        <p:cTn xmlns:p14="http://schemas.microsoft.com/office/powerpoint/2010/main" id="1" dur="indefinite" restart="never" nodeType="tmRoot"/>
+      </p:par>
+    </p:tnLst>
+  </p:timing>
 </p:sld>
 </file>
 

</xml_diff>

<commit_message>
added slide for rhoconnect settings
</commit_message>
<xml_diff>
--- a/RhoConnect-Push.pptx
+++ b/RhoConnect-Push.pptx
@@ -5,10 +5,10 @@
     <p:sldMasterId id="2147493455" r:id="rId4"/>
   </p:sldMasterIdLst>
   <p:notesMasterIdLst>
-    <p:notesMasterId r:id="rId16"/>
+    <p:notesMasterId r:id="rId17"/>
   </p:notesMasterIdLst>
   <p:handoutMasterIdLst>
-    <p:handoutMasterId r:id="rId17"/>
+    <p:handoutMasterId r:id="rId18"/>
   </p:handoutMasterIdLst>
   <p:sldIdLst>
     <p:sldId id="256" r:id="rId5"/>
@@ -19,9 +19,10 @@
     <p:sldId id="261" r:id="rId10"/>
     <p:sldId id="280" r:id="rId11"/>
     <p:sldId id="281" r:id="rId12"/>
-    <p:sldId id="283" r:id="rId13"/>
-    <p:sldId id="286" r:id="rId14"/>
-    <p:sldId id="272" r:id="rId15"/>
+    <p:sldId id="287" r:id="rId13"/>
+    <p:sldId id="283" r:id="rId14"/>
+    <p:sldId id="286" r:id="rId15"/>
+    <p:sldId id="272" r:id="rId16"/>
   </p:sldIdLst>
   <p:sldSz cx="9144000" cy="5143500" type="screen16x9"/>
   <p:notesSz cx="6858000" cy="9144000"/>
@@ -206,7 +207,7 @@
             <a:fld id="{03226B35-E884-5E4D-87DA-A7EDD87DC00C}" type="datetimeFigureOut">
               <a:rPr lang="en-US" smtClean="0"/>
               <a:pPr/>
-              <a:t>09/4/14</a:t>
+              <a:t>9/4/14</a:t>
             </a:fld>
             <a:endParaRPr lang="en-US"/>
           </a:p>
@@ -373,7 +374,7 @@
             <a:fld id="{6D788B50-DD5C-5F41-9B32-973BBF99E849}" type="datetimeFigureOut">
               <a:rPr lang="en-US" smtClean="0"/>
               <a:pPr/>
-              <a:t>09/4/14</a:t>
+              <a:t>9/4/14</a:t>
             </a:fld>
             <a:endParaRPr lang="en-US"/>
           </a:p>
@@ -796,7 +797,7 @@
             <a:fld id="{D77A3FF8-68AA-A041-ADA3-194758FF0D5D}" type="slidenum">
               <a:rPr lang="en-US" smtClean="0"/>
               <a:pPr/>
-              <a:t>10</a:t>
+              <a:t>11</a:t>
             </a:fld>
             <a:endParaRPr lang="en-US"/>
           </a:p>
@@ -888,7 +889,7 @@
             <a:fld id="{D77A3FF8-68AA-A041-ADA3-194758FF0D5D}" type="slidenum">
               <a:rPr lang="en-US" smtClean="0"/>
               <a:pPr/>
-              <a:t>11</a:t>
+              <a:t>12</a:t>
             </a:fld>
             <a:endParaRPr lang="en-US"/>
           </a:p>
@@ -1081,7 +1082,6 @@
               <a:rPr lang="en-US" baseline="0" dirty="0" smtClean="0"/>
               <a:t>With RhoConnect Push, you can send your traffic through your internal network to your RhoConnect app (deployed internally). </a:t>
             </a:r>
-            <a:endParaRPr lang="en-US" baseline="0" dirty="0" smtClean="0"/>
           </a:p>
           <a:p>
             <a:endParaRPr lang="en-US" baseline="0" dirty="0"/>
@@ -1875,11 +1875,7 @@
           <a:p>
             <a:r>
               <a:rPr lang="en-US" dirty="0" smtClean="0"/>
-              <a:t>Alright, let’s see it in action</a:t>
-            </a:r>
-            <a:r>
-              <a:rPr lang="en-US" dirty="0" smtClean="0"/>
-              <a:t>!</a:t>
+              <a:t>Alright, let’s see it in action!</a:t>
             </a:r>
           </a:p>
           <a:p>
@@ -1924,7 +1920,7 @@
             <a:fld id="{D77A3FF8-68AA-A041-ADA3-194758FF0D5D}" type="slidenum">
               <a:rPr lang="en-US" smtClean="0"/>
               <a:pPr/>
-              <a:t>9</a:t>
+              <a:t>10</a:t>
             </a:fld>
             <a:endParaRPr lang="en-US"/>
           </a:p>
@@ -12662,6 +12658,71 @@
           <a:p>
             <a:r>
               <a:rPr lang="en-US" dirty="0" smtClean="0"/>
+              <a:t>Demo</a:t>
+            </a:r>
+            <a:endParaRPr lang="en-US" dirty="0"/>
+          </a:p>
+        </p:txBody>
+      </p:sp>
+    </p:spTree>
+    <p:extLst>
+      <p:ext uri="{BB962C8B-B14F-4D97-AF65-F5344CB8AC3E}">
+        <p14:creationId xmlns:p14="http://schemas.microsoft.com/office/powerpoint/2010/main" val="3318731730"/>
+      </p:ext>
+    </p:extLst>
+  </p:cSld>
+  <p:clrMapOvr>
+    <a:masterClrMapping/>
+  </p:clrMapOvr>
+  <p:timing>
+    <p:tnLst>
+      <p:par>
+        <p:cTn xmlns:p14="http://schemas.microsoft.com/office/powerpoint/2010/main" id="1" dur="indefinite" restart="never" nodeType="tmRoot"/>
+      </p:par>
+    </p:tnLst>
+  </p:timing>
+</p:sld>
+</file>
+
+<file path=ppt/slides/slide11.xml><?xml version="1.0" encoding="utf-8"?>
+<p:sld xmlns:a="http://schemas.openxmlformats.org/drawingml/2006/main" xmlns:r="http://schemas.openxmlformats.org/officeDocument/2006/relationships" xmlns:p="http://schemas.openxmlformats.org/presentationml/2006/main">
+  <p:cSld>
+    <p:spTree>
+      <p:nvGrpSpPr>
+        <p:cNvPr id="1" name=""/>
+        <p:cNvGrpSpPr/>
+        <p:nvPr/>
+      </p:nvGrpSpPr>
+      <p:grpSpPr>
+        <a:xfrm>
+          <a:off x="0" y="0"/>
+          <a:ext cx="0" cy="0"/>
+          <a:chOff x="0" y="0"/>
+          <a:chExt cx="0" cy="0"/>
+        </a:xfrm>
+      </p:grpSpPr>
+      <p:sp>
+        <p:nvSpPr>
+          <p:cNvPr id="2" name="Text Placeholder 1"/>
+          <p:cNvSpPr>
+            <a:spLocks noGrp="1"/>
+          </p:cNvSpPr>
+          <p:nvPr>
+            <p:ph type="body" sz="quarter" idx="10"/>
+          </p:nvPr>
+        </p:nvSpPr>
+        <p:spPr>
+          <a:xfrm>
+            <a:off x="276458" y="1889010"/>
+            <a:ext cx="8127828" cy="918200"/>
+          </a:xfrm>
+        </p:spPr>
+        <p:txBody>
+          <a:bodyPr/>
+          <a:lstStyle/>
+          <a:p>
+            <a:r>
+              <a:rPr lang="en-US" dirty="0" smtClean="0"/>
               <a:t>Questions?</a:t>
             </a:r>
             <a:endParaRPr lang="en-US" dirty="0"/>
@@ -12688,7 +12749,7 @@
 </p:sld>
 </file>
 
-<file path=ppt/slides/slide11.xml><?xml version="1.0" encoding="utf-8"?>
+<file path=ppt/slides/slide12.xml><?xml version="1.0" encoding="utf-8"?>
 <p:sld xmlns:a="http://schemas.openxmlformats.org/drawingml/2006/main" xmlns:r="http://schemas.openxmlformats.org/officeDocument/2006/relationships" xmlns:p="http://schemas.openxmlformats.org/presentationml/2006/main">
   <p:cSld>
     <p:spTree>
@@ -15129,27 +15190,98 @@
       </p:grpSpPr>
       <p:sp>
         <p:nvSpPr>
-          <p:cNvPr id="2" name="Text Placeholder 1"/>
+          <p:cNvPr id="2" name="Title 1"/>
           <p:cNvSpPr>
             <a:spLocks noGrp="1"/>
           </p:cNvSpPr>
           <p:nvPr>
-            <p:ph type="body" sz="quarter" idx="10"/>
+            <p:ph type="title"/>
           </p:nvPr>
         </p:nvSpPr>
-        <p:spPr>
-          <a:xfrm>
-            <a:off x="276458" y="1889010"/>
-            <a:ext cx="8127828" cy="918200"/>
-          </a:xfrm>
-        </p:spPr>
+        <p:spPr/>
         <p:txBody>
           <a:bodyPr/>
           <a:lstStyle/>
           <a:p>
             <a:r>
               <a:rPr lang="en-US" dirty="0" smtClean="0"/>
-              <a:t>Demo</a:t>
+              <a:t>RhoConnect	</a:t>
+            </a:r>
+            <a:r>
+              <a:rPr lang="en-US" smtClean="0"/>
+              <a:t> push</a:t>
+            </a:r>
+            <a:endParaRPr lang="en-US" dirty="0"/>
+          </a:p>
+        </p:txBody>
+      </p:sp>
+      <p:sp>
+        <p:nvSpPr>
+          <p:cNvPr id="3" name="Content Placeholder 2"/>
+          <p:cNvSpPr>
+            <a:spLocks noGrp="1"/>
+          </p:cNvSpPr>
+          <p:nvPr>
+            <p:ph idx="1"/>
+          </p:nvPr>
+        </p:nvSpPr>
+        <p:spPr/>
+        <p:txBody>
+          <a:bodyPr/>
+          <a:lstStyle/>
+          <a:p>
+            <a:pPr marL="285750" indent="-285750">
+              <a:buFont typeface="Arial"/>
+              <a:buChar char="•"/>
+            </a:pPr>
+            <a:r>
+              <a:rPr lang="en-US" dirty="0" smtClean="0"/>
+              <a:t>Add/edit setting/</a:t>
+            </a:r>
+            <a:r>
+              <a:rPr lang="en-US" dirty="0" err="1" smtClean="0"/>
+              <a:t>settings.yml</a:t>
+            </a:r>
+            <a:endParaRPr lang="en-US" dirty="0" smtClean="0"/>
+          </a:p>
+          <a:p>
+            <a:pPr marL="1028700" lvl="1"/>
+            <a:r>
+              <a:rPr lang="en-US" dirty="0" smtClean="0"/>
+              <a:t>Add ‘:</a:t>
+            </a:r>
+            <a:r>
+              <a:rPr lang="en-US" dirty="0" err="1" smtClean="0"/>
+              <a:t>push_server</a:t>
+            </a:r>
+            <a:r>
+              <a:rPr lang="en-US" dirty="0" smtClean="0"/>
+              <a:t>: </a:t>
+            </a:r>
+            <a:r>
+              <a:rPr lang="en-US" dirty="0" smtClean="0">
+                <a:hlinkClick r:id="rId2"/>
+              </a:rPr>
+              <a:t>http://someappname:localhost:8675</a:t>
+            </a:r>
+            <a:r>
+              <a:rPr lang="en-US" dirty="0" smtClean="0"/>
+              <a:t>’</a:t>
+            </a:r>
+          </a:p>
+          <a:p>
+            <a:pPr marL="1028700" lvl="1"/>
+            <a:r>
+              <a:rPr lang="en-US" dirty="0" smtClean="0"/>
+              <a:t>Add ‘:</a:t>
+            </a:r>
+            <a:r>
+              <a:rPr lang="en-US" dirty="0" err="1" smtClean="0"/>
+              <a:t>push_notify</a:t>
+            </a:r>
+            <a:r>
+              <a:rPr lang="en-US" dirty="0" smtClean="0"/>
+              <a:t>: true’</a:t>
             </a:r>
             <a:endParaRPr lang="en-US" dirty="0"/>
           </a:p>
@@ -15158,20 +15290,13 @@
     </p:spTree>
     <p:extLst>
       <p:ext uri="{BB962C8B-B14F-4D97-AF65-F5344CB8AC3E}">
-        <p14:creationId xmlns:p14="http://schemas.microsoft.com/office/powerpoint/2010/main" val="3318731730"/>
+        <p14:creationId xmlns:p14="http://schemas.microsoft.com/office/powerpoint/2010/main" val="70218356"/>
       </p:ext>
     </p:extLst>
   </p:cSld>
   <p:clrMapOvr>
     <a:masterClrMapping/>
   </p:clrMapOvr>
-  <p:timing>
-    <p:tnLst>
-      <p:par>
-        <p:cTn xmlns:p14="http://schemas.microsoft.com/office/powerpoint/2010/main" id="1" dur="indefinite" restart="never" nodeType="tmRoot"/>
-      </p:par>
-    </p:tnLst>
-  </p:timing>
 </p:sld>
 </file>
 

</xml_diff>

<commit_message>
Update data flow slide
</commit_message>
<xml_diff>
--- a/RhoConnect-Push.pptx
+++ b/RhoConnect-Push.pptx
@@ -208,7 +208,7 @@
             <a:fld id="{03226B35-E884-5E4D-87DA-A7EDD87DC00C}" type="datetimeFigureOut">
               <a:rPr lang="en-US" smtClean="0"/>
               <a:pPr/>
-              <a:t>9/5/14</a:t>
+              <a:t>09/10/14</a:t>
             </a:fld>
             <a:endParaRPr lang="en-US"/>
           </a:p>
@@ -375,7 +375,7 @@
             <a:fld id="{6D788B50-DD5C-5F41-9B32-973BBF99E849}" type="datetimeFigureOut">
               <a:rPr lang="en-US" smtClean="0"/>
               <a:pPr/>
-              <a:t>9/5/14</a:t>
+              <a:t>09/10/14</a:t>
             </a:fld>
             <a:endParaRPr lang="en-US"/>
           </a:p>
@@ -12945,13 +12945,7 @@
               <a:rPr lang="en-US">
                 <a:hlinkClick r:id="rId3"/>
               </a:rPr>
-              <a:t>/en/5.0.0/rhoconnect/push-client</a:t>
-            </a:r>
-            <a:r>
-              <a:rPr lang="en-US">
-                <a:hlinkClick r:id="rId3"/>
-              </a:rPr>
-              <a:t>-</a:t>
+              <a:t>/en/5.0.0/rhoconnect/push-client-</a:t>
             </a:r>
             <a:r>
               <a:rPr lang="en-US" smtClean="0">
@@ -14538,39 +14532,6 @@
           </a:p>
         </p:txBody>
       </p:sp>
-      <p:cxnSp>
-        <p:nvCxnSpPr>
-          <p:cNvPr id="38" name="Straight Arrow Connector 37"/>
-          <p:cNvCxnSpPr/>
-          <p:nvPr/>
-        </p:nvCxnSpPr>
-        <p:spPr>
-          <a:xfrm flipV="1">
-            <a:off x="3081129" y="4141304"/>
-            <a:ext cx="2623656" cy="408609"/>
-          </a:xfrm>
-          <a:prstGeom prst="straightConnector1">
-            <a:avLst/>
-          </a:prstGeom>
-          <a:ln>
-            <a:tailEnd type="arrow"/>
-          </a:ln>
-        </p:spPr>
-        <p:style>
-          <a:lnRef idx="2">
-            <a:schemeClr val="accent3"/>
-          </a:lnRef>
-          <a:fillRef idx="0">
-            <a:schemeClr val="accent3"/>
-          </a:fillRef>
-          <a:effectRef idx="1">
-            <a:schemeClr val="accent3"/>
-          </a:effectRef>
-          <a:fontRef idx="minor">
-            <a:schemeClr val="tx1"/>
-          </a:fontRef>
-        </p:style>
-      </p:cxnSp>
       <p:sp>
         <p:nvSpPr>
           <p:cNvPr id="39" name="Rectangle 38"/>
@@ -14579,7 +14540,7 @@
         </p:nvSpPr>
         <p:spPr>
           <a:xfrm>
-            <a:off x="3876261" y="4472609"/>
+            <a:off x="3732695" y="4141304"/>
             <a:ext cx="905565" cy="397214"/>
           </a:xfrm>
           <a:prstGeom prst="rect">
@@ -14730,6 +14691,43 @@
           </a:p>
         </p:txBody>
       </p:sp>
+      <p:cxnSp>
+        <p:nvCxnSpPr>
+          <p:cNvPr id="14" name="Straight Arrow Connector 13"/>
+          <p:cNvCxnSpPr>
+            <a:stCxn id="5" idx="2"/>
+            <a:endCxn id="8" idx="6"/>
+          </p:cNvCxnSpPr>
+          <p:nvPr/>
+        </p:nvCxnSpPr>
+        <p:spPr>
+          <a:xfrm flipH="1">
+            <a:off x="2672520" y="3836212"/>
+            <a:ext cx="3166234" cy="305092"/>
+          </a:xfrm>
+          <a:prstGeom prst="straightConnector1">
+            <a:avLst/>
+          </a:prstGeom>
+          <a:ln>
+            <a:headEnd type="arrow"/>
+            <a:tailEnd type="arrow"/>
+          </a:ln>
+        </p:spPr>
+        <p:style>
+          <a:lnRef idx="2">
+            <a:schemeClr val="accent3"/>
+          </a:lnRef>
+          <a:fillRef idx="0">
+            <a:schemeClr val="accent3"/>
+          </a:fillRef>
+          <a:effectRef idx="1">
+            <a:schemeClr val="accent3"/>
+          </a:effectRef>
+          <a:fontRef idx="minor">
+            <a:schemeClr val="tx1"/>
+          </a:fontRef>
+        </p:style>
+      </p:cxnSp>
     </p:spTree>
     <p:extLst>
       <p:ext uri="{BB962C8B-B14F-4D97-AF65-F5344CB8AC3E}">

</xml_diff>

<commit_message>
Update Thank you slide with bit/ly Link.
</commit_message>
<xml_diff>
--- a/RhoConnect-Push.pptx
+++ b/RhoConnect-Push.pptx
@@ -1975,6 +1975,14 @@
           <a:bodyPr/>
           <a:lstStyle/>
           <a:p>
+            <a:r>
+              <a:rPr lang="en-US" dirty="0" smtClean="0"/>
+              <a:t>For your Rhoconnect side of the push connection,</a:t>
+            </a:r>
+            <a:r>
+              <a:rPr lang="en-US" baseline="0" dirty="0" smtClean="0"/>
+              <a:t> all you need to do is add a line to define your push server’s URL or IP address.</a:t>
+            </a:r>
             <a:endParaRPr lang="en-US" dirty="0"/>
           </a:p>
         </p:txBody>
@@ -13050,6 +13058,68 @@
               <a:t>THANK YOU</a:t>
             </a:r>
             <a:endParaRPr lang="en-US" dirty="0"/>
+          </a:p>
+        </p:txBody>
+      </p:sp>
+      <p:sp>
+        <p:nvSpPr>
+          <p:cNvPr id="3" name="TextBox 2"/>
+          <p:cNvSpPr txBox="1"/>
+          <p:nvPr/>
+        </p:nvSpPr>
+        <p:spPr>
+          <a:xfrm>
+            <a:off x="297459" y="2849236"/>
+            <a:ext cx="7951304" cy="830997"/>
+          </a:xfrm>
+          <a:prstGeom prst="rect">
+            <a:avLst/>
+          </a:prstGeom>
+          <a:noFill/>
+        </p:spPr>
+        <p:txBody>
+          <a:bodyPr wrap="square" rtlCol="0">
+            <a:spAutoFit/>
+          </a:bodyPr>
+          <a:lstStyle/>
+          <a:p>
+            <a:r>
+              <a:rPr lang="en-US" sz="4800" smtClean="0">
+                <a:solidFill>
+                  <a:schemeClr val="bg1"/>
+                </a:solidFill>
+              </a:rPr>
+              <a:t>http:</a:t>
+            </a:r>
+            <a:r>
+              <a:rPr lang="en-US" sz="4800" dirty="0" smtClean="0">
+                <a:solidFill>
+                  <a:schemeClr val="bg1"/>
+                </a:solidFill>
+              </a:rPr>
+              <a:t>//</a:t>
+            </a:r>
+            <a:r>
+              <a:rPr lang="en-US" sz="4800" dirty="0" err="1" smtClean="0">
+                <a:solidFill>
+                  <a:schemeClr val="bg1"/>
+                </a:solidFill>
+              </a:rPr>
+              <a:t>bit.ly</a:t>
+            </a:r>
+            <a:r>
+              <a:rPr lang="en-US" sz="4800" dirty="0" smtClean="0">
+                <a:solidFill>
+                  <a:schemeClr val="bg1"/>
+                </a:solidFill>
+              </a:rPr>
+              <a:t>/msisession30</a:t>
+            </a:r>
+            <a:endParaRPr lang="en-US" sz="4800" dirty="0">
+              <a:solidFill>
+                <a:schemeClr val="bg1"/>
+              </a:solidFill>
+            </a:endParaRPr>
           </a:p>
         </p:txBody>
       </p:sp>

</xml_diff>

<commit_message>
Added Push API to Links slide.
</commit_message>
<xml_diff>
--- a/RhoConnect-Push.pptx
+++ b/RhoConnect-Push.pptx
@@ -1064,15 +1064,15 @@
             </a:r>
             <a:r>
               <a:rPr lang="en-US" baseline="0" dirty="0" smtClean="0"/>
-              <a:t> RhoConnect Push session. My name is Michael Toews </a:t>
-            </a:r>
-            <a:r>
-              <a:rPr lang="en-US" baseline="0" smtClean="0"/>
-              <a:t>and I’m </a:t>
+              <a:t> RhoConnect Push session. My name is Michael Toews and I’m joined by </a:t>
             </a:r>
             <a:r>
               <a:rPr lang="en-US" baseline="0" dirty="0" smtClean="0"/>
-              <a:t>joined by Matt English and Alex </a:t>
+              <a:t>Matt </a:t>
+            </a:r>
+            <a:r>
+              <a:rPr lang="en-US" baseline="0" dirty="0" smtClean="0"/>
+              <a:t>English and Alex </a:t>
             </a:r>
             <a:r>
               <a:rPr lang="en-US" baseline="0" dirty="0" err="1" smtClean="0"/>
@@ -12929,7 +12929,7 @@
               <a:buChar char="•"/>
             </a:pPr>
             <a:r>
-              <a:rPr lang="en-US" dirty="0" err="1" smtClean="0"/>
+              <a:rPr lang="en-US" dirty="0" smtClean="0"/>
               <a:t>RhoMobile</a:t>
             </a:r>
             <a:r>
@@ -12953,7 +12953,13 @@
               <a:rPr lang="en-US">
                 <a:hlinkClick r:id="rId3"/>
               </a:rPr>
-              <a:t>/en/5.0.0/rhoconnect/push-client-</a:t>
+              <a:t>/en/5.0.0/rhoconnect/push-client</a:t>
+            </a:r>
+            <a:r>
+              <a:rPr lang="en-US">
+                <a:hlinkClick r:id="rId3"/>
+              </a:rPr>
+              <a:t>-</a:t>
             </a:r>
             <a:r>
               <a:rPr lang="en-US" smtClean="0">
@@ -12961,18 +12967,32 @@
               </a:rPr>
               <a:t>setup</a:t>
             </a:r>
-            <a:r>
-              <a:rPr lang="en-US" smtClean="0"/>
-              <a:t> </a:t>
-            </a:r>
-            <a:endParaRPr lang="en-US"/>
+            <a:endParaRPr lang="en-US" dirty="0" smtClean="0"/>
+          </a:p>
+          <a:p>
+            <a:pPr marL="285750" indent="-285750">
+              <a:buFont typeface="Arial"/>
+              <a:buChar char="•"/>
+            </a:pPr>
+            <a:r>
+              <a:rPr lang="en-US" dirty="0" smtClean="0"/>
+              <a:t>Push API reference</a:t>
+            </a:r>
           </a:p>
           <a:p>
             <a:pPr marL="1028700" lvl="1"/>
-            <a:endParaRPr lang="en-US" dirty="0" smtClean="0"/>
-          </a:p>
-          <a:p>
-            <a:pPr marL="1028700" lvl="1"/>
+            <a:r>
+              <a:rPr lang="en-US" dirty="0">
+                <a:hlinkClick r:id="rId4"/>
+              </a:rPr>
+              <a:t>http://docs.rhomobile.com/en/5.0.0/api/</a:t>
+            </a:r>
+            <a:r>
+              <a:rPr lang="en-US" dirty="0" smtClean="0">
+                <a:hlinkClick r:id="rId4"/>
+              </a:rPr>
+              <a:t>push</a:t>
+            </a:r>
             <a:endParaRPr lang="en-US" dirty="0"/>
           </a:p>
         </p:txBody>
@@ -13084,20 +13104,12 @@
           <a:lstStyle/>
           <a:p>
             <a:r>
-              <a:rPr lang="en-US" sz="4800" smtClean="0">
-                <a:solidFill>
-                  <a:schemeClr val="bg1"/>
-                </a:solidFill>
-              </a:rPr>
-              <a:t>http:</a:t>
-            </a:r>
-            <a:r>
               <a:rPr lang="en-US" sz="4800" dirty="0" smtClean="0">
                 <a:solidFill>
                   <a:schemeClr val="bg1"/>
                 </a:solidFill>
               </a:rPr>
-              <a:t>//</a:t>
+              <a:t>http://</a:t>
             </a:r>
             <a:r>
               <a:rPr lang="en-US" sz="4800" dirty="0" err="1" smtClean="0">

</xml_diff>